<commit_message>
another change to figures and analyses
</commit_message>
<xml_diff>
--- a/figures/fig4/fig4.pptx
+++ b/figures/fig4/fig4.pptx
@@ -254,7 +254,7 @@
           <a:p>
             <a:fld id="{C54E43BD-EA58-43D8-A1A4-D38A51955219}" type="datetimeFigureOut">
               <a:rPr lang="en-NZ" smtClean="0"/>
-              <a:t>7/01/2020</a:t>
+              <a:t>8/01/2020</a:t>
             </a:fld>
             <a:endParaRPr lang="en-NZ"/>
           </a:p>
@@ -424,7 +424,7 @@
           <a:p>
             <a:fld id="{C54E43BD-EA58-43D8-A1A4-D38A51955219}" type="datetimeFigureOut">
               <a:rPr lang="en-NZ" smtClean="0"/>
-              <a:t>7/01/2020</a:t>
+              <a:t>8/01/2020</a:t>
             </a:fld>
             <a:endParaRPr lang="en-NZ"/>
           </a:p>
@@ -604,7 +604,7 @@
           <a:p>
             <a:fld id="{C54E43BD-EA58-43D8-A1A4-D38A51955219}" type="datetimeFigureOut">
               <a:rPr lang="en-NZ" smtClean="0"/>
-              <a:t>7/01/2020</a:t>
+              <a:t>8/01/2020</a:t>
             </a:fld>
             <a:endParaRPr lang="en-NZ"/>
           </a:p>
@@ -774,7 +774,7 @@
           <a:p>
             <a:fld id="{C54E43BD-EA58-43D8-A1A4-D38A51955219}" type="datetimeFigureOut">
               <a:rPr lang="en-NZ" smtClean="0"/>
-              <a:t>7/01/2020</a:t>
+              <a:t>8/01/2020</a:t>
             </a:fld>
             <a:endParaRPr lang="en-NZ"/>
           </a:p>
@@ -1020,7 +1020,7 @@
           <a:p>
             <a:fld id="{C54E43BD-EA58-43D8-A1A4-D38A51955219}" type="datetimeFigureOut">
               <a:rPr lang="en-NZ" smtClean="0"/>
-              <a:t>7/01/2020</a:t>
+              <a:t>8/01/2020</a:t>
             </a:fld>
             <a:endParaRPr lang="en-NZ"/>
           </a:p>
@@ -1252,7 +1252,7 @@
           <a:p>
             <a:fld id="{C54E43BD-EA58-43D8-A1A4-D38A51955219}" type="datetimeFigureOut">
               <a:rPr lang="en-NZ" smtClean="0"/>
-              <a:t>7/01/2020</a:t>
+              <a:t>8/01/2020</a:t>
             </a:fld>
             <a:endParaRPr lang="en-NZ"/>
           </a:p>
@@ -1619,7 +1619,7 @@
           <a:p>
             <a:fld id="{C54E43BD-EA58-43D8-A1A4-D38A51955219}" type="datetimeFigureOut">
               <a:rPr lang="en-NZ" smtClean="0"/>
-              <a:t>7/01/2020</a:t>
+              <a:t>8/01/2020</a:t>
             </a:fld>
             <a:endParaRPr lang="en-NZ"/>
           </a:p>
@@ -1737,7 +1737,7 @@
           <a:p>
             <a:fld id="{C54E43BD-EA58-43D8-A1A4-D38A51955219}" type="datetimeFigureOut">
               <a:rPr lang="en-NZ" smtClean="0"/>
-              <a:t>7/01/2020</a:t>
+              <a:t>8/01/2020</a:t>
             </a:fld>
             <a:endParaRPr lang="en-NZ"/>
           </a:p>
@@ -1832,7 +1832,7 @@
           <a:p>
             <a:fld id="{C54E43BD-EA58-43D8-A1A4-D38A51955219}" type="datetimeFigureOut">
               <a:rPr lang="en-NZ" smtClean="0"/>
-              <a:t>7/01/2020</a:t>
+              <a:t>8/01/2020</a:t>
             </a:fld>
             <a:endParaRPr lang="en-NZ"/>
           </a:p>
@@ -2109,7 +2109,7 @@
           <a:p>
             <a:fld id="{C54E43BD-EA58-43D8-A1A4-D38A51955219}" type="datetimeFigureOut">
               <a:rPr lang="en-NZ" smtClean="0"/>
-              <a:t>7/01/2020</a:t>
+              <a:t>8/01/2020</a:t>
             </a:fld>
             <a:endParaRPr lang="en-NZ"/>
           </a:p>
@@ -2362,7 +2362,7 @@
           <a:p>
             <a:fld id="{C54E43BD-EA58-43D8-A1A4-D38A51955219}" type="datetimeFigureOut">
               <a:rPr lang="en-NZ" smtClean="0"/>
-              <a:t>7/01/2020</a:t>
+              <a:t>8/01/2020</a:t>
             </a:fld>
             <a:endParaRPr lang="en-NZ"/>
           </a:p>
@@ -2575,7 +2575,7 @@
           <a:p>
             <a:fld id="{C54E43BD-EA58-43D8-A1A4-D38A51955219}" type="datetimeFigureOut">
               <a:rPr lang="en-NZ" smtClean="0"/>
-              <a:t>7/01/2020</a:t>
+              <a:t>8/01/2020</a:t>
             </a:fld>
             <a:endParaRPr lang="en-NZ"/>
           </a:p>
@@ -4311,7 +4311,7 @@
                 <a:latin typeface="Arial" panose="020B0604020202020204" pitchFamily="34" charset="0"/>
                 <a:cs typeface="Arial" panose="020B0604020202020204" pitchFamily="34" charset="0"/>
               </a:rPr>
-              <a:t>0.72*</a:t>
+              <a:t>5.30*</a:t>
             </a:r>
             <a:endParaRPr lang="en-NZ" dirty="0">
               <a:latin typeface="Arial" panose="020B0604020202020204" pitchFamily="34" charset="0"/>
@@ -4367,7 +4367,14 @@
                 <a:latin typeface="Arial" panose="020B0604020202020204" pitchFamily="34" charset="0"/>
                 <a:cs typeface="Arial" panose="020B0604020202020204" pitchFamily="34" charset="0"/>
               </a:rPr>
-              <a:t>5.30*</a:t>
+              <a:t>0.72</a:t>
+            </a:r>
+            <a:r>
+              <a:rPr lang="en-NZ" dirty="0" smtClean="0">
+                <a:latin typeface="Arial" panose="020B0604020202020204" pitchFamily="34" charset="0"/>
+                <a:cs typeface="Arial" panose="020B0604020202020204" pitchFamily="34" charset="0"/>
+              </a:rPr>
+              <a:t>*</a:t>
             </a:r>
             <a:endParaRPr lang="en-NZ" dirty="0">
               <a:latin typeface="Arial" panose="020B0604020202020204" pitchFamily="34" charset="0"/>
@@ -4479,7 +4486,7 @@
                 <a:latin typeface="Arial" panose="020B0604020202020204" pitchFamily="34" charset="0"/>
                 <a:cs typeface="Arial" panose="020B0604020202020204" pitchFamily="34" charset="0"/>
               </a:rPr>
-              <a:t>1.00*</a:t>
+              <a:t>1.00</a:t>
             </a:r>
             <a:endParaRPr lang="en-NZ" dirty="0">
               <a:latin typeface="Arial" panose="020B0604020202020204" pitchFamily="34" charset="0"/>
@@ -4552,7 +4559,7 @@
         </p:nvSpPr>
         <p:spPr>
           <a:xfrm>
-            <a:off x="9560622" y="4241438"/>
+            <a:off x="9543689" y="4241438"/>
             <a:ext cx="720000" cy="288000"/>
           </a:xfrm>
           <a:prstGeom prst="rect">
@@ -4591,7 +4598,7 @@
                 <a:latin typeface="Arial" panose="020B0604020202020204" pitchFamily="34" charset="0"/>
                 <a:cs typeface="Arial" panose="020B0604020202020204" pitchFamily="34" charset="0"/>
               </a:rPr>
-              <a:t>1.00</a:t>
+              <a:t>1.00*</a:t>
             </a:r>
             <a:endParaRPr lang="en-NZ" dirty="0">
               <a:latin typeface="Arial" panose="020B0604020202020204" pitchFamily="34" charset="0"/>

</xml_diff>